<commit_message>
prepare dealer tech rollout presentation for pull request
</commit_message>
<xml_diff>
--- a/for-posdealers/presentation/tech/media/posdealer-tech-rollout.pptx
+++ b/for-posdealers/presentation/tech/media/posdealer-tech-rollout.pptx
@@ -4052,7 +4052,7 @@
           <a:p>
             <a:fld id="{E52F4C69-7549-4A71-BB0C-341D25F594E8}" type="datetime1">
               <a:rPr lang="de-AT" smtClean="0"/>
-              <a:t>08.09.20</a:t>
+              <a:t>09.09.20</a:t>
             </a:fld>
             <a:endParaRPr lang="de-AT"/>
           </a:p>
@@ -4455,7 +4455,7 @@
           <a:p>
             <a:fld id="{E52F4C69-7549-4A71-BB0C-341D25F594E8}" type="datetime1">
               <a:rPr lang="de-AT" smtClean="0"/>
-              <a:t>08.09.20</a:t>
+              <a:t>09.09.20</a:t>
             </a:fld>
             <a:endParaRPr lang="de-AT"/>
           </a:p>
@@ -4541,6 +4541,63 @@
           <a:bodyPr/>
           <a:lstStyle/>
           <a:p>
+            <a:r>
+              <a:rPr lang="de-DE" dirty="0"/>
+              <a:t>Vorführung Anhand:</a:t>
+            </a:r>
+          </a:p>
+          <a:p>
+            <a:r>
+              <a:rPr lang="de-DE" dirty="0"/>
+              <a:t>https://</a:t>
+            </a:r>
+            <a:r>
+              <a:rPr lang="de-DE" dirty="0" err="1"/>
+              <a:t>docs.fiskaltrust.cloud</a:t>
+            </a:r>
+            <a:r>
+              <a:rPr lang="de-DE" dirty="0"/>
+              <a:t>/</a:t>
+            </a:r>
+            <a:r>
+              <a:rPr lang="de-DE" dirty="0" err="1"/>
+              <a:t>doc</a:t>
+            </a:r>
+            <a:r>
+              <a:rPr lang="de-DE" dirty="0"/>
+              <a:t>/</a:t>
+            </a:r>
+            <a:r>
+              <a:rPr lang="de-DE" dirty="0" err="1"/>
+              <a:t>productdescription</a:t>
+            </a:r>
+            <a:r>
+              <a:rPr lang="de-DE" dirty="0"/>
+              <a:t>-de-</a:t>
+            </a:r>
+            <a:r>
+              <a:rPr lang="de-DE" dirty="0" err="1"/>
+              <a:t>doc</a:t>
+            </a:r>
+            <a:r>
+              <a:rPr lang="de-DE" dirty="0"/>
+              <a:t>/</a:t>
+            </a:r>
+            <a:r>
+              <a:rPr lang="de-DE" dirty="0" err="1"/>
+              <a:t>for-posdealers</a:t>
+            </a:r>
+            <a:r>
+              <a:rPr lang="de-DE" dirty="0"/>
+              <a:t>/02-pre-sales/automatisierter-</a:t>
+            </a:r>
+            <a:r>
+              <a:rPr lang="de-DE" dirty="0" err="1"/>
+              <a:t>rollout.html</a:t>
+            </a:r>
+            <a:endParaRPr lang="de-DE" dirty="0"/>
+          </a:p>
+          <a:p>
             <a:endParaRPr lang="de-DE" dirty="0"/>
           </a:p>
         </p:txBody>
@@ -4585,7 +4642,7 @@
           <a:p>
             <a:fld id="{E52F4C69-7549-4A71-BB0C-341D25F594E8}" type="datetime1">
               <a:rPr lang="de-AT" smtClean="0"/>
-              <a:t>08.09.20</a:t>
+              <a:t>09.09.20</a:t>
             </a:fld>
             <a:endParaRPr lang="de-AT"/>
           </a:p>
@@ -4671,6 +4728,63 @@
           <a:bodyPr/>
           <a:lstStyle/>
           <a:p>
+            <a:r>
+              <a:rPr lang="de-DE" dirty="0"/>
+              <a:t>Vorführung Anhand Portal +</a:t>
+            </a:r>
+          </a:p>
+          <a:p>
+            <a:r>
+              <a:rPr lang="de-DE" dirty="0"/>
+              <a:t>https://</a:t>
+            </a:r>
+            <a:r>
+              <a:rPr lang="de-DE" dirty="0" err="1"/>
+              <a:t>docs.fiskaltrust.cloud</a:t>
+            </a:r>
+            <a:r>
+              <a:rPr lang="de-DE" dirty="0"/>
+              <a:t>/</a:t>
+            </a:r>
+            <a:r>
+              <a:rPr lang="de-DE" dirty="0" err="1"/>
+              <a:t>doc</a:t>
+            </a:r>
+            <a:r>
+              <a:rPr lang="de-DE" dirty="0"/>
+              <a:t>/</a:t>
+            </a:r>
+            <a:r>
+              <a:rPr lang="de-DE" dirty="0" err="1"/>
+              <a:t>productdescription</a:t>
+            </a:r>
+            <a:r>
+              <a:rPr lang="de-DE" dirty="0"/>
+              <a:t>-de-</a:t>
+            </a:r>
+            <a:r>
+              <a:rPr lang="de-DE" dirty="0" err="1"/>
+              <a:t>doc</a:t>
+            </a:r>
+            <a:r>
+              <a:rPr lang="de-DE" dirty="0"/>
+              <a:t>/</a:t>
+            </a:r>
+            <a:r>
+              <a:rPr lang="de-DE" dirty="0" err="1"/>
+              <a:t>for-posdealers</a:t>
+            </a:r>
+            <a:r>
+              <a:rPr lang="de-DE" dirty="0"/>
+              <a:t>/02-pre-sales/automatisierter-</a:t>
+            </a:r>
+            <a:r>
+              <a:rPr lang="de-DE" dirty="0" err="1"/>
+              <a:t>rollout.html</a:t>
+            </a:r>
+            <a:endParaRPr lang="de-DE" dirty="0"/>
+          </a:p>
+          <a:p>
             <a:endParaRPr lang="de-DE" dirty="0"/>
           </a:p>
         </p:txBody>
@@ -4715,7 +4829,7 @@
           <a:p>
             <a:fld id="{E52F4C69-7549-4A71-BB0C-341D25F594E8}" type="datetime1">
               <a:rPr lang="de-AT" smtClean="0"/>
-              <a:t>08.09.20</a:t>
+              <a:t>09.09.20</a:t>
             </a:fld>
             <a:endParaRPr lang="de-AT"/>
           </a:p>
@@ -4738,7 +4852,7 @@
           <a:p>
             <a:fld id="{37D9B929-EEB3-453F-899C-B5737EAC3251}" type="slidenum">
               <a:rPr lang="de-AT" smtClean="0"/>
-              <a:t>15</a:t>
+              <a:t>12</a:t>
             </a:fld>
             <a:endParaRPr lang="de-AT"/>
           </a:p>
@@ -4747,7 +4861,7 @@
     </p:spTree>
     <p:extLst>
       <p:ext uri="{BB962C8B-B14F-4D97-AF65-F5344CB8AC3E}">
-        <p14:creationId xmlns:p14="http://schemas.microsoft.com/office/powerpoint/2010/main" val="1458951094"/>
+        <p14:creationId xmlns:p14="http://schemas.microsoft.com/office/powerpoint/2010/main" val="1986252184"/>
       </p:ext>
     </p:extLst>
   </p:cSld>
@@ -4801,6 +4915,63 @@
           <a:bodyPr/>
           <a:lstStyle/>
           <a:p>
+            <a:r>
+              <a:rPr lang="de-DE" dirty="0"/>
+              <a:t>Vorführung Anhand Portal +</a:t>
+            </a:r>
+          </a:p>
+          <a:p>
+            <a:r>
+              <a:rPr lang="de-DE" dirty="0"/>
+              <a:t>https://</a:t>
+            </a:r>
+            <a:r>
+              <a:rPr lang="de-DE" dirty="0" err="1"/>
+              <a:t>docs.fiskaltrust.cloud</a:t>
+            </a:r>
+            <a:r>
+              <a:rPr lang="de-DE" dirty="0"/>
+              <a:t>/</a:t>
+            </a:r>
+            <a:r>
+              <a:rPr lang="de-DE" dirty="0" err="1"/>
+              <a:t>doc</a:t>
+            </a:r>
+            <a:r>
+              <a:rPr lang="de-DE" dirty="0"/>
+              <a:t>/</a:t>
+            </a:r>
+            <a:r>
+              <a:rPr lang="de-DE" dirty="0" err="1"/>
+              <a:t>productdescription</a:t>
+            </a:r>
+            <a:r>
+              <a:rPr lang="de-DE" dirty="0"/>
+              <a:t>-de-</a:t>
+            </a:r>
+            <a:r>
+              <a:rPr lang="de-DE" dirty="0" err="1"/>
+              <a:t>doc</a:t>
+            </a:r>
+            <a:r>
+              <a:rPr lang="de-DE" dirty="0"/>
+              <a:t>/</a:t>
+            </a:r>
+            <a:r>
+              <a:rPr lang="de-DE" dirty="0" err="1"/>
+              <a:t>for-posdealers</a:t>
+            </a:r>
+            <a:r>
+              <a:rPr lang="de-DE" dirty="0"/>
+              <a:t>/02-pre-sales/automatisierter-</a:t>
+            </a:r>
+            <a:r>
+              <a:rPr lang="de-DE" dirty="0" err="1"/>
+              <a:t>rollout.html</a:t>
+            </a:r>
+            <a:endParaRPr lang="de-DE" dirty="0"/>
+          </a:p>
+          <a:p>
             <a:endParaRPr lang="de-DE" dirty="0"/>
           </a:p>
         </p:txBody>
@@ -4845,7 +5016,7 @@
           <a:p>
             <a:fld id="{E52F4C69-7549-4A71-BB0C-341D25F594E8}" type="datetime1">
               <a:rPr lang="de-AT" smtClean="0"/>
-              <a:t>08.09.20</a:t>
+              <a:t>09.09.20</a:t>
             </a:fld>
             <a:endParaRPr lang="de-AT"/>
           </a:p>
@@ -4868,7 +5039,7 @@
           <a:p>
             <a:fld id="{37D9B929-EEB3-453F-899C-B5737EAC3251}" type="slidenum">
               <a:rPr lang="de-AT" smtClean="0"/>
-              <a:t>17</a:t>
+              <a:t>13</a:t>
             </a:fld>
             <a:endParaRPr lang="de-AT"/>
           </a:p>
@@ -4877,7 +5048,7 @@
     </p:spTree>
     <p:extLst>
       <p:ext uri="{BB962C8B-B14F-4D97-AF65-F5344CB8AC3E}">
-        <p14:creationId xmlns:p14="http://schemas.microsoft.com/office/powerpoint/2010/main" val="385413735"/>
+        <p14:creationId xmlns:p14="http://schemas.microsoft.com/office/powerpoint/2010/main" val="1339702047"/>
       </p:ext>
     </p:extLst>
   </p:cSld>
@@ -4931,6 +5102,63 @@
           <a:bodyPr/>
           <a:lstStyle/>
           <a:p>
+            <a:r>
+              <a:rPr lang="de-DE" dirty="0"/>
+              <a:t>Vorführung Anhand:</a:t>
+            </a:r>
+          </a:p>
+          <a:p>
+            <a:r>
+              <a:rPr lang="de-DE" dirty="0"/>
+              <a:t>https://</a:t>
+            </a:r>
+            <a:r>
+              <a:rPr lang="de-DE" dirty="0" err="1"/>
+              <a:t>docs.fiskaltrust.cloud</a:t>
+            </a:r>
+            <a:r>
+              <a:rPr lang="de-DE" dirty="0"/>
+              <a:t>/</a:t>
+            </a:r>
+            <a:r>
+              <a:rPr lang="de-DE" dirty="0" err="1"/>
+              <a:t>doc</a:t>
+            </a:r>
+            <a:r>
+              <a:rPr lang="de-DE" dirty="0"/>
+              <a:t>/</a:t>
+            </a:r>
+            <a:r>
+              <a:rPr lang="de-DE" dirty="0" err="1"/>
+              <a:t>productdescription</a:t>
+            </a:r>
+            <a:r>
+              <a:rPr lang="de-DE" dirty="0"/>
+              <a:t>-de-</a:t>
+            </a:r>
+            <a:r>
+              <a:rPr lang="de-DE" dirty="0" err="1"/>
+              <a:t>doc</a:t>
+            </a:r>
+            <a:r>
+              <a:rPr lang="de-DE" dirty="0"/>
+              <a:t>/</a:t>
+            </a:r>
+            <a:r>
+              <a:rPr lang="de-DE" dirty="0" err="1"/>
+              <a:t>for-posdealers</a:t>
+            </a:r>
+            <a:r>
+              <a:rPr lang="de-DE" dirty="0"/>
+              <a:t>/02-pre-sales/automatisierter-</a:t>
+            </a:r>
+            <a:r>
+              <a:rPr lang="de-DE" dirty="0" err="1"/>
+              <a:t>rollout.html</a:t>
+            </a:r>
+            <a:endParaRPr lang="de-DE" dirty="0"/>
+          </a:p>
+          <a:p>
             <a:endParaRPr lang="de-DE" dirty="0"/>
           </a:p>
         </p:txBody>
@@ -4975,7 +5203,7 @@
           <a:p>
             <a:fld id="{E52F4C69-7549-4A71-BB0C-341D25F594E8}" type="datetime1">
               <a:rPr lang="de-AT" smtClean="0"/>
-              <a:t>08.09.20</a:t>
+              <a:t>09.09.20</a:t>
             </a:fld>
             <a:endParaRPr lang="de-AT"/>
           </a:p>
@@ -4998,7 +5226,7 @@
           <a:p>
             <a:fld id="{37D9B929-EEB3-453F-899C-B5737EAC3251}" type="slidenum">
               <a:rPr lang="de-AT" smtClean="0"/>
-              <a:t>18</a:t>
+              <a:t>14</a:t>
             </a:fld>
             <a:endParaRPr lang="de-AT"/>
           </a:p>
@@ -5007,7 +5235,7 @@
     </p:spTree>
     <p:extLst>
       <p:ext uri="{BB962C8B-B14F-4D97-AF65-F5344CB8AC3E}">
-        <p14:creationId xmlns:p14="http://schemas.microsoft.com/office/powerpoint/2010/main" val="988095609"/>
+        <p14:creationId xmlns:p14="http://schemas.microsoft.com/office/powerpoint/2010/main" val="823278608"/>
       </p:ext>
     </p:extLst>
   </p:cSld>
@@ -5063,6 +5291,12 @@
           <a:p>
             <a:r>
               <a:rPr lang="de-DE" dirty="0"/>
+              <a:t>Vorführung Anhand:</a:t>
+            </a:r>
+          </a:p>
+          <a:p>
+            <a:r>
+              <a:rPr lang="de-DE" dirty="0"/>
               <a:t>https://</a:t>
             </a:r>
             <a:r>
@@ -5103,12 +5337,15 @@
             </a:r>
             <a:r>
               <a:rPr lang="de-DE" dirty="0"/>
-              <a:t>/02-pre-sales/rollout-</a:t>
+              <a:t>/02-pre-sales/automatisierter-</a:t>
             </a:r>
             <a:r>
               <a:rPr lang="de-DE" dirty="0" err="1"/>
-              <a:t>scenarios.html</a:t>
-            </a:r>
+              <a:t>rollout.html</a:t>
+            </a:r>
+            <a:endParaRPr lang="de-DE" dirty="0"/>
+          </a:p>
+          <a:p>
             <a:endParaRPr lang="de-DE" dirty="0"/>
           </a:p>
         </p:txBody>
@@ -5153,7 +5390,7 @@
           <a:p>
             <a:fld id="{E52F4C69-7549-4A71-BB0C-341D25F594E8}" type="datetime1">
               <a:rPr lang="de-AT" smtClean="0"/>
-              <a:t>08.09.20</a:t>
+              <a:t>09.09.20</a:t>
             </a:fld>
             <a:endParaRPr lang="de-AT"/>
           </a:p>
@@ -5176,7 +5413,7 @@
           <a:p>
             <a:fld id="{37D9B929-EEB3-453F-899C-B5737EAC3251}" type="slidenum">
               <a:rPr lang="de-AT" smtClean="0"/>
-              <a:t>21</a:t>
+              <a:t>15</a:t>
             </a:fld>
             <a:endParaRPr lang="de-AT"/>
           </a:p>
@@ -5185,7 +5422,7 @@
     </p:spTree>
     <p:extLst>
       <p:ext uri="{BB962C8B-B14F-4D97-AF65-F5344CB8AC3E}">
-        <p14:creationId xmlns:p14="http://schemas.microsoft.com/office/powerpoint/2010/main" val="307574156"/>
+        <p14:creationId xmlns:p14="http://schemas.microsoft.com/office/powerpoint/2010/main" val="1458951094"/>
       </p:ext>
     </p:extLst>
   </p:cSld>
@@ -5239,6 +5476,63 @@
           <a:bodyPr/>
           <a:lstStyle/>
           <a:p>
+            <a:r>
+              <a:rPr lang="de-DE" dirty="0"/>
+              <a:t>Vorführung Anhand:</a:t>
+            </a:r>
+          </a:p>
+          <a:p>
+            <a:r>
+              <a:rPr lang="de-DE" dirty="0"/>
+              <a:t>https://</a:t>
+            </a:r>
+            <a:r>
+              <a:rPr lang="de-DE" dirty="0" err="1"/>
+              <a:t>docs.fiskaltrust.cloud</a:t>
+            </a:r>
+            <a:r>
+              <a:rPr lang="de-DE" dirty="0"/>
+              <a:t>/</a:t>
+            </a:r>
+            <a:r>
+              <a:rPr lang="de-DE" dirty="0" err="1"/>
+              <a:t>doc</a:t>
+            </a:r>
+            <a:r>
+              <a:rPr lang="de-DE" dirty="0"/>
+              <a:t>/</a:t>
+            </a:r>
+            <a:r>
+              <a:rPr lang="de-DE" dirty="0" err="1"/>
+              <a:t>productdescription</a:t>
+            </a:r>
+            <a:r>
+              <a:rPr lang="de-DE" dirty="0"/>
+              <a:t>-de-</a:t>
+            </a:r>
+            <a:r>
+              <a:rPr lang="de-DE" dirty="0" err="1"/>
+              <a:t>doc</a:t>
+            </a:r>
+            <a:r>
+              <a:rPr lang="de-DE" dirty="0"/>
+              <a:t>/</a:t>
+            </a:r>
+            <a:r>
+              <a:rPr lang="de-DE" dirty="0" err="1"/>
+              <a:t>for-posdealers</a:t>
+            </a:r>
+            <a:r>
+              <a:rPr lang="de-DE" dirty="0"/>
+              <a:t>/02-pre-sales/automatisierter-</a:t>
+            </a:r>
+            <a:r>
+              <a:rPr lang="de-DE" dirty="0" err="1"/>
+              <a:t>rollout.html</a:t>
+            </a:r>
+            <a:endParaRPr lang="de-DE" dirty="0"/>
+          </a:p>
+          <a:p>
             <a:endParaRPr lang="de-DE" dirty="0"/>
           </a:p>
         </p:txBody>
@@ -5283,7 +5577,7 @@
           <a:p>
             <a:fld id="{E52F4C69-7549-4A71-BB0C-341D25F594E8}" type="datetime1">
               <a:rPr lang="de-AT" smtClean="0"/>
-              <a:t>08.09.20</a:t>
+              <a:t>09.09.20</a:t>
             </a:fld>
             <a:endParaRPr lang="de-AT"/>
           </a:p>
@@ -5306,7 +5600,7 @@
           <a:p>
             <a:fld id="{37D9B929-EEB3-453F-899C-B5737EAC3251}" type="slidenum">
               <a:rPr lang="de-AT" smtClean="0"/>
-              <a:t>22</a:t>
+              <a:t>16</a:t>
             </a:fld>
             <a:endParaRPr lang="de-AT"/>
           </a:p>
@@ -5315,7 +5609,755 @@
     </p:spTree>
     <p:extLst>
       <p:ext uri="{BB962C8B-B14F-4D97-AF65-F5344CB8AC3E}">
-        <p14:creationId xmlns:p14="http://schemas.microsoft.com/office/powerpoint/2010/main" val="899144978"/>
+        <p14:creationId xmlns:p14="http://schemas.microsoft.com/office/powerpoint/2010/main" val="4097642693"/>
+      </p:ext>
+    </p:extLst>
+  </p:cSld>
+  <p:clrMapOvr>
+    <a:masterClrMapping/>
+  </p:clrMapOvr>
+</p:notes>
+</file>
+
+<file path=ppt/notesSlides/notesSlide16.xml><?xml version="1.0" encoding="utf-8"?>
+<p:notes xmlns:a="http://schemas.openxmlformats.org/drawingml/2006/main" xmlns:r="http://schemas.openxmlformats.org/officeDocument/2006/relationships" xmlns:p="http://schemas.openxmlformats.org/presentationml/2006/main">
+  <p:cSld>
+    <p:spTree>
+      <p:nvGrpSpPr>
+        <p:cNvPr id="1" name=""/>
+        <p:cNvGrpSpPr/>
+        <p:nvPr/>
+      </p:nvGrpSpPr>
+      <p:grpSpPr>
+        <a:xfrm>
+          <a:off x="0" y="0"/>
+          <a:ext cx="0" cy="0"/>
+          <a:chOff x="0" y="0"/>
+          <a:chExt cx="0" cy="0"/>
+        </a:xfrm>
+      </p:grpSpPr>
+      <p:sp>
+        <p:nvSpPr>
+          <p:cNvPr id="2" name="Slide Image Placeholder 1"/>
+          <p:cNvSpPr>
+            <a:spLocks noGrp="1" noRot="1" noChangeAspect="1"/>
+          </p:cNvSpPr>
+          <p:nvPr>
+            <p:ph type="sldImg"/>
+          </p:nvPr>
+        </p:nvSpPr>
+        <p:spPr/>
+      </p:sp>
+      <p:sp>
+        <p:nvSpPr>
+          <p:cNvPr id="3" name="Notes Placeholder 2"/>
+          <p:cNvSpPr>
+            <a:spLocks noGrp="1"/>
+          </p:cNvSpPr>
+          <p:nvPr>
+            <p:ph type="body" idx="1"/>
+          </p:nvPr>
+        </p:nvSpPr>
+        <p:spPr/>
+        <p:txBody>
+          <a:bodyPr/>
+          <a:lstStyle/>
+          <a:p>
+            <a:r>
+              <a:rPr lang="de-DE" dirty="0"/>
+              <a:t>Vorführung Anhand:</a:t>
+            </a:r>
+          </a:p>
+          <a:p>
+            <a:r>
+              <a:rPr lang="de-DE" dirty="0"/>
+              <a:t>https://</a:t>
+            </a:r>
+            <a:r>
+              <a:rPr lang="de-DE" dirty="0" err="1"/>
+              <a:t>docs.fiskaltrust.cloud</a:t>
+            </a:r>
+            <a:r>
+              <a:rPr lang="de-DE" dirty="0"/>
+              <a:t>/</a:t>
+            </a:r>
+            <a:r>
+              <a:rPr lang="de-DE" dirty="0" err="1"/>
+              <a:t>doc</a:t>
+            </a:r>
+            <a:r>
+              <a:rPr lang="de-DE" dirty="0"/>
+              <a:t>/</a:t>
+            </a:r>
+            <a:r>
+              <a:rPr lang="de-DE" dirty="0" err="1"/>
+              <a:t>productdescription</a:t>
+            </a:r>
+            <a:r>
+              <a:rPr lang="de-DE" dirty="0"/>
+              <a:t>-de-</a:t>
+            </a:r>
+            <a:r>
+              <a:rPr lang="de-DE" dirty="0" err="1"/>
+              <a:t>doc</a:t>
+            </a:r>
+            <a:r>
+              <a:rPr lang="de-DE" dirty="0"/>
+              <a:t>/</a:t>
+            </a:r>
+            <a:r>
+              <a:rPr lang="de-DE" dirty="0" err="1"/>
+              <a:t>for-posdealers</a:t>
+            </a:r>
+            <a:r>
+              <a:rPr lang="de-DE" dirty="0"/>
+              <a:t>/02-pre-sales/automatisierter-</a:t>
+            </a:r>
+            <a:r>
+              <a:rPr lang="de-DE" dirty="0" err="1"/>
+              <a:t>rollout.html</a:t>
+            </a:r>
+            <a:endParaRPr lang="de-DE" dirty="0"/>
+          </a:p>
+          <a:p>
+            <a:endParaRPr lang="de-DE" dirty="0"/>
+          </a:p>
+        </p:txBody>
+      </p:sp>
+      <p:sp>
+        <p:nvSpPr>
+          <p:cNvPr id="4" name="Header Placeholder 3"/>
+          <p:cNvSpPr>
+            <a:spLocks noGrp="1"/>
+          </p:cNvSpPr>
+          <p:nvPr>
+            <p:ph type="hdr" sz="quarter"/>
+          </p:nvPr>
+        </p:nvSpPr>
+        <p:spPr/>
+        <p:txBody>
+          <a:bodyPr/>
+          <a:lstStyle/>
+          <a:p>
+            <a:r>
+              <a:rPr lang="de-AT"/>
+              <a:t>fiskaltrust. consulting gmbh - confidential</a:t>
+            </a:r>
+            <a:endParaRPr lang="de-AT" dirty="0"/>
+          </a:p>
+        </p:txBody>
+      </p:sp>
+      <p:sp>
+        <p:nvSpPr>
+          <p:cNvPr id="5" name="Date Placeholder 4"/>
+          <p:cNvSpPr>
+            <a:spLocks noGrp="1"/>
+          </p:cNvSpPr>
+          <p:nvPr>
+            <p:ph type="dt" idx="1"/>
+          </p:nvPr>
+        </p:nvSpPr>
+        <p:spPr/>
+        <p:txBody>
+          <a:bodyPr/>
+          <a:lstStyle/>
+          <a:p>
+            <a:fld id="{E52F4C69-7549-4A71-BB0C-341D25F594E8}" type="datetime1">
+              <a:rPr lang="de-AT" smtClean="0"/>
+              <a:t>09.09.20</a:t>
+            </a:fld>
+            <a:endParaRPr lang="de-AT"/>
+          </a:p>
+        </p:txBody>
+      </p:sp>
+      <p:sp>
+        <p:nvSpPr>
+          <p:cNvPr id="6" name="Slide Number Placeholder 5"/>
+          <p:cNvSpPr>
+            <a:spLocks noGrp="1"/>
+          </p:cNvSpPr>
+          <p:nvPr>
+            <p:ph type="sldNum" sz="quarter" idx="5"/>
+          </p:nvPr>
+        </p:nvSpPr>
+        <p:spPr/>
+        <p:txBody>
+          <a:bodyPr/>
+          <a:lstStyle/>
+          <a:p>
+            <a:fld id="{37D9B929-EEB3-453F-899C-B5737EAC3251}" type="slidenum">
+              <a:rPr lang="de-AT" smtClean="0"/>
+              <a:t>17</a:t>
+            </a:fld>
+            <a:endParaRPr lang="de-AT"/>
+          </a:p>
+        </p:txBody>
+      </p:sp>
+    </p:spTree>
+    <p:extLst>
+      <p:ext uri="{BB962C8B-B14F-4D97-AF65-F5344CB8AC3E}">
+        <p14:creationId xmlns:p14="http://schemas.microsoft.com/office/powerpoint/2010/main" val="385413735"/>
+      </p:ext>
+    </p:extLst>
+  </p:cSld>
+  <p:clrMapOvr>
+    <a:masterClrMapping/>
+  </p:clrMapOvr>
+</p:notes>
+</file>
+
+<file path=ppt/notesSlides/notesSlide17.xml><?xml version="1.0" encoding="utf-8"?>
+<p:notes xmlns:a="http://schemas.openxmlformats.org/drawingml/2006/main" xmlns:r="http://schemas.openxmlformats.org/officeDocument/2006/relationships" xmlns:p="http://schemas.openxmlformats.org/presentationml/2006/main">
+  <p:cSld>
+    <p:spTree>
+      <p:nvGrpSpPr>
+        <p:cNvPr id="1" name=""/>
+        <p:cNvGrpSpPr/>
+        <p:nvPr/>
+      </p:nvGrpSpPr>
+      <p:grpSpPr>
+        <a:xfrm>
+          <a:off x="0" y="0"/>
+          <a:ext cx="0" cy="0"/>
+          <a:chOff x="0" y="0"/>
+          <a:chExt cx="0" cy="0"/>
+        </a:xfrm>
+      </p:grpSpPr>
+      <p:sp>
+        <p:nvSpPr>
+          <p:cNvPr id="2" name="Slide Image Placeholder 1"/>
+          <p:cNvSpPr>
+            <a:spLocks noGrp="1" noRot="1" noChangeAspect="1"/>
+          </p:cNvSpPr>
+          <p:nvPr>
+            <p:ph type="sldImg"/>
+          </p:nvPr>
+        </p:nvSpPr>
+        <p:spPr/>
+      </p:sp>
+      <p:sp>
+        <p:nvSpPr>
+          <p:cNvPr id="3" name="Notes Placeholder 2"/>
+          <p:cNvSpPr>
+            <a:spLocks noGrp="1"/>
+          </p:cNvSpPr>
+          <p:nvPr>
+            <p:ph type="body" idx="1"/>
+          </p:nvPr>
+        </p:nvSpPr>
+        <p:spPr/>
+        <p:txBody>
+          <a:bodyPr/>
+          <a:lstStyle/>
+          <a:p>
+            <a:r>
+              <a:rPr lang="de-DE" dirty="0"/>
+              <a:t>Vorführung Anhand:</a:t>
+            </a:r>
+          </a:p>
+          <a:p>
+            <a:r>
+              <a:rPr lang="de-DE" dirty="0"/>
+              <a:t>https://</a:t>
+            </a:r>
+            <a:r>
+              <a:rPr lang="de-DE" dirty="0" err="1"/>
+              <a:t>docs.fiskaltrust.cloud</a:t>
+            </a:r>
+            <a:r>
+              <a:rPr lang="de-DE" dirty="0"/>
+              <a:t>/</a:t>
+            </a:r>
+            <a:r>
+              <a:rPr lang="de-DE" dirty="0" err="1"/>
+              <a:t>doc</a:t>
+            </a:r>
+            <a:r>
+              <a:rPr lang="de-DE" dirty="0"/>
+              <a:t>/</a:t>
+            </a:r>
+            <a:r>
+              <a:rPr lang="de-DE" dirty="0" err="1"/>
+              <a:t>productdescription</a:t>
+            </a:r>
+            <a:r>
+              <a:rPr lang="de-DE" dirty="0"/>
+              <a:t>-de-</a:t>
+            </a:r>
+            <a:r>
+              <a:rPr lang="de-DE" dirty="0" err="1"/>
+              <a:t>doc</a:t>
+            </a:r>
+            <a:r>
+              <a:rPr lang="de-DE" dirty="0"/>
+              <a:t>/</a:t>
+            </a:r>
+            <a:r>
+              <a:rPr lang="de-DE" dirty="0" err="1"/>
+              <a:t>for-posdealers</a:t>
+            </a:r>
+            <a:r>
+              <a:rPr lang="de-DE" dirty="0"/>
+              <a:t>/02-pre-sales/automatisierter-</a:t>
+            </a:r>
+            <a:r>
+              <a:rPr lang="de-DE" dirty="0" err="1"/>
+              <a:t>rollout.html</a:t>
+            </a:r>
+            <a:endParaRPr lang="de-DE" dirty="0"/>
+          </a:p>
+          <a:p>
+            <a:endParaRPr lang="de-DE" dirty="0"/>
+          </a:p>
+        </p:txBody>
+      </p:sp>
+      <p:sp>
+        <p:nvSpPr>
+          <p:cNvPr id="4" name="Header Placeholder 3"/>
+          <p:cNvSpPr>
+            <a:spLocks noGrp="1"/>
+          </p:cNvSpPr>
+          <p:nvPr>
+            <p:ph type="hdr" sz="quarter"/>
+          </p:nvPr>
+        </p:nvSpPr>
+        <p:spPr/>
+        <p:txBody>
+          <a:bodyPr/>
+          <a:lstStyle/>
+          <a:p>
+            <a:r>
+              <a:rPr lang="de-AT"/>
+              <a:t>fiskaltrust. consulting gmbh - confidential</a:t>
+            </a:r>
+            <a:endParaRPr lang="de-AT" dirty="0"/>
+          </a:p>
+        </p:txBody>
+      </p:sp>
+      <p:sp>
+        <p:nvSpPr>
+          <p:cNvPr id="5" name="Date Placeholder 4"/>
+          <p:cNvSpPr>
+            <a:spLocks noGrp="1"/>
+          </p:cNvSpPr>
+          <p:nvPr>
+            <p:ph type="dt" idx="1"/>
+          </p:nvPr>
+        </p:nvSpPr>
+        <p:spPr/>
+        <p:txBody>
+          <a:bodyPr/>
+          <a:lstStyle/>
+          <a:p>
+            <a:fld id="{E52F4C69-7549-4A71-BB0C-341D25F594E8}" type="datetime1">
+              <a:rPr lang="de-AT" smtClean="0"/>
+              <a:t>09.09.20</a:t>
+            </a:fld>
+            <a:endParaRPr lang="de-AT"/>
+          </a:p>
+        </p:txBody>
+      </p:sp>
+      <p:sp>
+        <p:nvSpPr>
+          <p:cNvPr id="6" name="Slide Number Placeholder 5"/>
+          <p:cNvSpPr>
+            <a:spLocks noGrp="1"/>
+          </p:cNvSpPr>
+          <p:nvPr>
+            <p:ph type="sldNum" sz="quarter" idx="5"/>
+          </p:nvPr>
+        </p:nvSpPr>
+        <p:spPr/>
+        <p:txBody>
+          <a:bodyPr/>
+          <a:lstStyle/>
+          <a:p>
+            <a:fld id="{37D9B929-EEB3-453F-899C-B5737EAC3251}" type="slidenum">
+              <a:rPr lang="de-AT" smtClean="0"/>
+              <a:t>18</a:t>
+            </a:fld>
+            <a:endParaRPr lang="de-AT"/>
+          </a:p>
+        </p:txBody>
+      </p:sp>
+    </p:spTree>
+    <p:extLst>
+      <p:ext uri="{BB962C8B-B14F-4D97-AF65-F5344CB8AC3E}">
+        <p14:creationId xmlns:p14="http://schemas.microsoft.com/office/powerpoint/2010/main" val="988095609"/>
+      </p:ext>
+    </p:extLst>
+  </p:cSld>
+  <p:clrMapOvr>
+    <a:masterClrMapping/>
+  </p:clrMapOvr>
+</p:notes>
+</file>
+
+<file path=ppt/notesSlides/notesSlide18.xml><?xml version="1.0" encoding="utf-8"?>
+<p:notes xmlns:a="http://schemas.openxmlformats.org/drawingml/2006/main" xmlns:r="http://schemas.openxmlformats.org/officeDocument/2006/relationships" xmlns:p="http://schemas.openxmlformats.org/presentationml/2006/main">
+  <p:cSld>
+    <p:spTree>
+      <p:nvGrpSpPr>
+        <p:cNvPr id="1" name=""/>
+        <p:cNvGrpSpPr/>
+        <p:nvPr/>
+      </p:nvGrpSpPr>
+      <p:grpSpPr>
+        <a:xfrm>
+          <a:off x="0" y="0"/>
+          <a:ext cx="0" cy="0"/>
+          <a:chOff x="0" y="0"/>
+          <a:chExt cx="0" cy="0"/>
+        </a:xfrm>
+      </p:grpSpPr>
+      <p:sp>
+        <p:nvSpPr>
+          <p:cNvPr id="2" name="Slide Image Placeholder 1"/>
+          <p:cNvSpPr>
+            <a:spLocks noGrp="1" noRot="1" noChangeAspect="1"/>
+          </p:cNvSpPr>
+          <p:nvPr>
+            <p:ph type="sldImg"/>
+          </p:nvPr>
+        </p:nvSpPr>
+        <p:spPr/>
+      </p:sp>
+      <p:sp>
+        <p:nvSpPr>
+          <p:cNvPr id="3" name="Notes Placeholder 2"/>
+          <p:cNvSpPr>
+            <a:spLocks noGrp="1"/>
+          </p:cNvSpPr>
+          <p:nvPr>
+            <p:ph type="body" idx="1"/>
+          </p:nvPr>
+        </p:nvSpPr>
+        <p:spPr/>
+        <p:txBody>
+          <a:bodyPr/>
+          <a:lstStyle/>
+          <a:p>
+            <a:r>
+              <a:rPr lang="de-DE" dirty="0"/>
+              <a:t>Vorführung Anhand:</a:t>
+            </a:r>
+          </a:p>
+          <a:p>
+            <a:r>
+              <a:rPr lang="de-DE" dirty="0"/>
+              <a:t>https://</a:t>
+            </a:r>
+            <a:r>
+              <a:rPr lang="de-DE" dirty="0" err="1"/>
+              <a:t>docs.fiskaltrust.cloud</a:t>
+            </a:r>
+            <a:r>
+              <a:rPr lang="de-DE" dirty="0"/>
+              <a:t>/</a:t>
+            </a:r>
+            <a:r>
+              <a:rPr lang="de-DE" dirty="0" err="1"/>
+              <a:t>doc</a:t>
+            </a:r>
+            <a:r>
+              <a:rPr lang="de-DE" dirty="0"/>
+              <a:t>/</a:t>
+            </a:r>
+            <a:r>
+              <a:rPr lang="de-DE" dirty="0" err="1"/>
+              <a:t>productdescription</a:t>
+            </a:r>
+            <a:r>
+              <a:rPr lang="de-DE" dirty="0"/>
+              <a:t>-de-</a:t>
+            </a:r>
+            <a:r>
+              <a:rPr lang="de-DE" dirty="0" err="1"/>
+              <a:t>doc</a:t>
+            </a:r>
+            <a:r>
+              <a:rPr lang="de-DE" dirty="0"/>
+              <a:t>/</a:t>
+            </a:r>
+            <a:r>
+              <a:rPr lang="de-DE" dirty="0" err="1"/>
+              <a:t>for-posdealers</a:t>
+            </a:r>
+            <a:r>
+              <a:rPr lang="de-DE" dirty="0"/>
+              <a:t>/02-pre-sales/automatisierter-</a:t>
+            </a:r>
+            <a:r>
+              <a:rPr lang="de-DE" dirty="0" err="1"/>
+              <a:t>rollout.html</a:t>
+            </a:r>
+            <a:endParaRPr lang="de-DE" dirty="0"/>
+          </a:p>
+          <a:p>
+            <a:endParaRPr lang="de-DE" dirty="0"/>
+          </a:p>
+        </p:txBody>
+      </p:sp>
+      <p:sp>
+        <p:nvSpPr>
+          <p:cNvPr id="4" name="Header Placeholder 3"/>
+          <p:cNvSpPr>
+            <a:spLocks noGrp="1"/>
+          </p:cNvSpPr>
+          <p:nvPr>
+            <p:ph type="hdr" sz="quarter"/>
+          </p:nvPr>
+        </p:nvSpPr>
+        <p:spPr/>
+        <p:txBody>
+          <a:bodyPr/>
+          <a:lstStyle/>
+          <a:p>
+            <a:r>
+              <a:rPr lang="de-AT"/>
+              <a:t>fiskaltrust. consulting gmbh - confidential</a:t>
+            </a:r>
+            <a:endParaRPr lang="de-AT" dirty="0"/>
+          </a:p>
+        </p:txBody>
+      </p:sp>
+      <p:sp>
+        <p:nvSpPr>
+          <p:cNvPr id="5" name="Date Placeholder 4"/>
+          <p:cNvSpPr>
+            <a:spLocks noGrp="1"/>
+          </p:cNvSpPr>
+          <p:nvPr>
+            <p:ph type="dt" idx="1"/>
+          </p:nvPr>
+        </p:nvSpPr>
+        <p:spPr/>
+        <p:txBody>
+          <a:bodyPr/>
+          <a:lstStyle/>
+          <a:p>
+            <a:fld id="{E52F4C69-7549-4A71-BB0C-341D25F594E8}" type="datetime1">
+              <a:rPr lang="de-AT" smtClean="0"/>
+              <a:t>09.09.20</a:t>
+            </a:fld>
+            <a:endParaRPr lang="de-AT"/>
+          </a:p>
+        </p:txBody>
+      </p:sp>
+      <p:sp>
+        <p:nvSpPr>
+          <p:cNvPr id="6" name="Slide Number Placeholder 5"/>
+          <p:cNvSpPr>
+            <a:spLocks noGrp="1"/>
+          </p:cNvSpPr>
+          <p:nvPr>
+            <p:ph type="sldNum" sz="quarter" idx="5"/>
+          </p:nvPr>
+        </p:nvSpPr>
+        <p:spPr/>
+        <p:txBody>
+          <a:bodyPr/>
+          <a:lstStyle/>
+          <a:p>
+            <a:fld id="{37D9B929-EEB3-453F-899C-B5737EAC3251}" type="slidenum">
+              <a:rPr lang="de-AT" smtClean="0"/>
+              <a:t>19</a:t>
+            </a:fld>
+            <a:endParaRPr lang="de-AT"/>
+          </a:p>
+        </p:txBody>
+      </p:sp>
+    </p:spTree>
+    <p:extLst>
+      <p:ext uri="{BB962C8B-B14F-4D97-AF65-F5344CB8AC3E}">
+        <p14:creationId xmlns:p14="http://schemas.microsoft.com/office/powerpoint/2010/main" val="2838738621"/>
+      </p:ext>
+    </p:extLst>
+  </p:cSld>
+  <p:clrMapOvr>
+    <a:masterClrMapping/>
+  </p:clrMapOvr>
+</p:notes>
+</file>
+
+<file path=ppt/notesSlides/notesSlide19.xml><?xml version="1.0" encoding="utf-8"?>
+<p:notes xmlns:a="http://schemas.openxmlformats.org/drawingml/2006/main" xmlns:r="http://schemas.openxmlformats.org/officeDocument/2006/relationships" xmlns:p="http://schemas.openxmlformats.org/presentationml/2006/main">
+  <p:cSld>
+    <p:spTree>
+      <p:nvGrpSpPr>
+        <p:cNvPr id="1" name=""/>
+        <p:cNvGrpSpPr/>
+        <p:nvPr/>
+      </p:nvGrpSpPr>
+      <p:grpSpPr>
+        <a:xfrm>
+          <a:off x="0" y="0"/>
+          <a:ext cx="0" cy="0"/>
+          <a:chOff x="0" y="0"/>
+          <a:chExt cx="0" cy="0"/>
+        </a:xfrm>
+      </p:grpSpPr>
+      <p:sp>
+        <p:nvSpPr>
+          <p:cNvPr id="2" name="Slide Image Placeholder 1"/>
+          <p:cNvSpPr>
+            <a:spLocks noGrp="1" noRot="1" noChangeAspect="1"/>
+          </p:cNvSpPr>
+          <p:nvPr>
+            <p:ph type="sldImg"/>
+          </p:nvPr>
+        </p:nvSpPr>
+        <p:spPr/>
+      </p:sp>
+      <p:sp>
+        <p:nvSpPr>
+          <p:cNvPr id="3" name="Notes Placeholder 2"/>
+          <p:cNvSpPr>
+            <a:spLocks noGrp="1"/>
+          </p:cNvSpPr>
+          <p:nvPr>
+            <p:ph type="body" idx="1"/>
+          </p:nvPr>
+        </p:nvSpPr>
+        <p:spPr/>
+        <p:txBody>
+          <a:bodyPr/>
+          <a:lstStyle/>
+          <a:p>
+            <a:r>
+              <a:rPr lang="de-DE" dirty="0"/>
+              <a:t>Vorführung Anhand:</a:t>
+            </a:r>
+          </a:p>
+          <a:p>
+            <a:r>
+              <a:rPr lang="de-DE" dirty="0"/>
+              <a:t>https://</a:t>
+            </a:r>
+            <a:r>
+              <a:rPr lang="de-DE" dirty="0" err="1"/>
+              <a:t>docs.fiskaltrust.cloud</a:t>
+            </a:r>
+            <a:r>
+              <a:rPr lang="de-DE" dirty="0"/>
+              <a:t>/</a:t>
+            </a:r>
+            <a:r>
+              <a:rPr lang="de-DE" dirty="0" err="1"/>
+              <a:t>doc</a:t>
+            </a:r>
+            <a:r>
+              <a:rPr lang="de-DE" dirty="0"/>
+              <a:t>/</a:t>
+            </a:r>
+            <a:r>
+              <a:rPr lang="de-DE" dirty="0" err="1"/>
+              <a:t>productdescription</a:t>
+            </a:r>
+            <a:r>
+              <a:rPr lang="de-DE" dirty="0"/>
+              <a:t>-de-</a:t>
+            </a:r>
+            <a:r>
+              <a:rPr lang="de-DE" dirty="0" err="1"/>
+              <a:t>doc</a:t>
+            </a:r>
+            <a:r>
+              <a:rPr lang="de-DE" dirty="0"/>
+              <a:t>/</a:t>
+            </a:r>
+            <a:r>
+              <a:rPr lang="de-DE" dirty="0" err="1"/>
+              <a:t>for-posdealers</a:t>
+            </a:r>
+            <a:r>
+              <a:rPr lang="de-DE" dirty="0"/>
+              <a:t>/02-pre-sales/automatisierter-</a:t>
+            </a:r>
+            <a:r>
+              <a:rPr lang="de-DE" dirty="0" err="1"/>
+              <a:t>rollout.html</a:t>
+            </a:r>
+            <a:endParaRPr lang="de-DE" dirty="0"/>
+          </a:p>
+          <a:p>
+            <a:endParaRPr lang="de-DE" dirty="0"/>
+          </a:p>
+        </p:txBody>
+      </p:sp>
+      <p:sp>
+        <p:nvSpPr>
+          <p:cNvPr id="4" name="Header Placeholder 3"/>
+          <p:cNvSpPr>
+            <a:spLocks noGrp="1"/>
+          </p:cNvSpPr>
+          <p:nvPr>
+            <p:ph type="hdr" sz="quarter"/>
+          </p:nvPr>
+        </p:nvSpPr>
+        <p:spPr/>
+        <p:txBody>
+          <a:bodyPr/>
+          <a:lstStyle/>
+          <a:p>
+            <a:r>
+              <a:rPr lang="de-AT"/>
+              <a:t>fiskaltrust. consulting gmbh - confidential</a:t>
+            </a:r>
+            <a:endParaRPr lang="de-AT" dirty="0"/>
+          </a:p>
+        </p:txBody>
+      </p:sp>
+      <p:sp>
+        <p:nvSpPr>
+          <p:cNvPr id="5" name="Date Placeholder 4"/>
+          <p:cNvSpPr>
+            <a:spLocks noGrp="1"/>
+          </p:cNvSpPr>
+          <p:nvPr>
+            <p:ph type="dt" idx="1"/>
+          </p:nvPr>
+        </p:nvSpPr>
+        <p:spPr/>
+        <p:txBody>
+          <a:bodyPr/>
+          <a:lstStyle/>
+          <a:p>
+            <a:fld id="{E52F4C69-7549-4A71-BB0C-341D25F594E8}" type="datetime1">
+              <a:rPr lang="de-AT" smtClean="0"/>
+              <a:t>09.09.20</a:t>
+            </a:fld>
+            <a:endParaRPr lang="de-AT"/>
+          </a:p>
+        </p:txBody>
+      </p:sp>
+      <p:sp>
+        <p:nvSpPr>
+          <p:cNvPr id="6" name="Slide Number Placeholder 5"/>
+          <p:cNvSpPr>
+            <a:spLocks noGrp="1"/>
+          </p:cNvSpPr>
+          <p:nvPr>
+            <p:ph type="sldNum" sz="quarter" idx="5"/>
+          </p:nvPr>
+        </p:nvSpPr>
+        <p:spPr/>
+        <p:txBody>
+          <a:bodyPr/>
+          <a:lstStyle/>
+          <a:p>
+            <a:fld id="{37D9B929-EEB3-453F-899C-B5737EAC3251}" type="slidenum">
+              <a:rPr lang="de-AT" smtClean="0"/>
+              <a:t>20</a:t>
+            </a:fld>
+            <a:endParaRPr lang="de-AT"/>
+          </a:p>
+        </p:txBody>
+      </p:sp>
+    </p:spTree>
+    <p:extLst>
+      <p:ext uri="{BB962C8B-B14F-4D97-AF65-F5344CB8AC3E}">
+        <p14:creationId xmlns:p14="http://schemas.microsoft.com/office/powerpoint/2010/main" val="3233502931"/>
       </p:ext>
     </p:extLst>
   </p:cSld>
@@ -5388,7 +6430,7 @@
             </a:pPr>
             <a:r>
               <a:rPr lang="de-DE" sz="1100" dirty="0"/>
-              <a:t>Das fiskaltrust Portal wird als Rollout Management Tool verwendet. Es unterstützt Kassenhändler bei der Vorbereitung und Ausführung des Rollout.</a:t>
+              <a:t>Das fiskaltrust Portal wird als Rollout Management Tool verwendet. Es unterstützt Kassenhändler bei der Vorbereitung und Ausführung des Rollouts.</a:t>
             </a:r>
           </a:p>
           <a:p>
@@ -5443,7 +6485,7 @@
             </a:pPr>
             <a:r>
               <a:rPr lang="de-DE" sz="1100" dirty="0"/>
-              <a:t>Im Portal kann die Einladung der Kassenbetreiber die Vorbereitung der Konfiguration und der Download des Launcher erfolgen. Im Folgenden gehen wir auf die Details hierzu ein.</a:t>
+              <a:t>Im Portal kann die Einladung der Kassenbetreiber die Vorbereitung der Konfiguration und der Download des Launchers erfolgen. Im Folgenden gehen wir auf die Details hierzu ein.</a:t>
             </a:r>
           </a:p>
           <a:p>
@@ -5503,7 +6545,7 @@
           <a:p>
             <a:fld id="{E52F4C69-7549-4A71-BB0C-341D25F594E8}" type="datetime1">
               <a:rPr lang="de-AT" smtClean="0"/>
-              <a:t>08.09.20</a:t>
+              <a:t>09.09.20</a:t>
             </a:fld>
             <a:endParaRPr lang="de-AT"/>
           </a:p>
@@ -5536,6 +6578,314 @@
     <p:extLst>
       <p:ext uri="{BB962C8B-B14F-4D97-AF65-F5344CB8AC3E}">
         <p14:creationId xmlns:p14="http://schemas.microsoft.com/office/powerpoint/2010/main" val="1532984696"/>
+      </p:ext>
+    </p:extLst>
+  </p:cSld>
+  <p:clrMapOvr>
+    <a:masterClrMapping/>
+  </p:clrMapOvr>
+</p:notes>
+</file>
+
+<file path=ppt/notesSlides/notesSlide20.xml><?xml version="1.0" encoding="utf-8"?>
+<p:notes xmlns:a="http://schemas.openxmlformats.org/drawingml/2006/main" xmlns:r="http://schemas.openxmlformats.org/officeDocument/2006/relationships" xmlns:p="http://schemas.openxmlformats.org/presentationml/2006/main">
+  <p:cSld>
+    <p:spTree>
+      <p:nvGrpSpPr>
+        <p:cNvPr id="1" name=""/>
+        <p:cNvGrpSpPr/>
+        <p:nvPr/>
+      </p:nvGrpSpPr>
+      <p:grpSpPr>
+        <a:xfrm>
+          <a:off x="0" y="0"/>
+          <a:ext cx="0" cy="0"/>
+          <a:chOff x="0" y="0"/>
+          <a:chExt cx="0" cy="0"/>
+        </a:xfrm>
+      </p:grpSpPr>
+      <p:sp>
+        <p:nvSpPr>
+          <p:cNvPr id="2" name="Slide Image Placeholder 1"/>
+          <p:cNvSpPr>
+            <a:spLocks noGrp="1" noRot="1" noChangeAspect="1"/>
+          </p:cNvSpPr>
+          <p:nvPr>
+            <p:ph type="sldImg"/>
+          </p:nvPr>
+        </p:nvSpPr>
+        <p:spPr/>
+      </p:sp>
+      <p:sp>
+        <p:nvSpPr>
+          <p:cNvPr id="3" name="Notes Placeholder 2"/>
+          <p:cNvSpPr>
+            <a:spLocks noGrp="1"/>
+          </p:cNvSpPr>
+          <p:nvPr>
+            <p:ph type="body" idx="1"/>
+          </p:nvPr>
+        </p:nvSpPr>
+        <p:spPr/>
+        <p:txBody>
+          <a:bodyPr/>
+          <a:lstStyle/>
+          <a:p>
+            <a:r>
+              <a:rPr lang="de-DE" dirty="0"/>
+              <a:t>https://</a:t>
+            </a:r>
+            <a:r>
+              <a:rPr lang="de-DE" dirty="0" err="1"/>
+              <a:t>docs.fiskaltrust.cloud</a:t>
+            </a:r>
+            <a:r>
+              <a:rPr lang="de-DE" dirty="0"/>
+              <a:t>/</a:t>
+            </a:r>
+            <a:r>
+              <a:rPr lang="de-DE" dirty="0" err="1"/>
+              <a:t>doc</a:t>
+            </a:r>
+            <a:r>
+              <a:rPr lang="de-DE" dirty="0"/>
+              <a:t>/</a:t>
+            </a:r>
+            <a:r>
+              <a:rPr lang="de-DE" dirty="0" err="1"/>
+              <a:t>productdescription</a:t>
+            </a:r>
+            <a:r>
+              <a:rPr lang="de-DE" dirty="0"/>
+              <a:t>-de-</a:t>
+            </a:r>
+            <a:r>
+              <a:rPr lang="de-DE" dirty="0" err="1"/>
+              <a:t>doc</a:t>
+            </a:r>
+            <a:r>
+              <a:rPr lang="de-DE" dirty="0"/>
+              <a:t>/</a:t>
+            </a:r>
+            <a:r>
+              <a:rPr lang="de-DE" dirty="0" err="1"/>
+              <a:t>for-posdealers</a:t>
+            </a:r>
+            <a:r>
+              <a:rPr lang="de-DE" dirty="0"/>
+              <a:t>/02-pre-sales/rollout-</a:t>
+            </a:r>
+            <a:r>
+              <a:rPr lang="de-DE" dirty="0" err="1"/>
+              <a:t>scenarios.html</a:t>
+            </a:r>
+            <a:endParaRPr lang="de-DE" dirty="0"/>
+          </a:p>
+        </p:txBody>
+      </p:sp>
+      <p:sp>
+        <p:nvSpPr>
+          <p:cNvPr id="4" name="Header Placeholder 3"/>
+          <p:cNvSpPr>
+            <a:spLocks noGrp="1"/>
+          </p:cNvSpPr>
+          <p:nvPr>
+            <p:ph type="hdr" sz="quarter"/>
+          </p:nvPr>
+        </p:nvSpPr>
+        <p:spPr/>
+        <p:txBody>
+          <a:bodyPr/>
+          <a:lstStyle/>
+          <a:p>
+            <a:r>
+              <a:rPr lang="de-AT"/>
+              <a:t>fiskaltrust. consulting gmbh - confidential</a:t>
+            </a:r>
+            <a:endParaRPr lang="de-AT" dirty="0"/>
+          </a:p>
+        </p:txBody>
+      </p:sp>
+      <p:sp>
+        <p:nvSpPr>
+          <p:cNvPr id="5" name="Date Placeholder 4"/>
+          <p:cNvSpPr>
+            <a:spLocks noGrp="1"/>
+          </p:cNvSpPr>
+          <p:nvPr>
+            <p:ph type="dt" idx="1"/>
+          </p:nvPr>
+        </p:nvSpPr>
+        <p:spPr/>
+        <p:txBody>
+          <a:bodyPr/>
+          <a:lstStyle/>
+          <a:p>
+            <a:fld id="{E52F4C69-7549-4A71-BB0C-341D25F594E8}" type="datetime1">
+              <a:rPr lang="de-AT" smtClean="0"/>
+              <a:t>09.09.20</a:t>
+            </a:fld>
+            <a:endParaRPr lang="de-AT"/>
+          </a:p>
+        </p:txBody>
+      </p:sp>
+      <p:sp>
+        <p:nvSpPr>
+          <p:cNvPr id="6" name="Slide Number Placeholder 5"/>
+          <p:cNvSpPr>
+            <a:spLocks noGrp="1"/>
+          </p:cNvSpPr>
+          <p:nvPr>
+            <p:ph type="sldNum" sz="quarter" idx="5"/>
+          </p:nvPr>
+        </p:nvSpPr>
+        <p:spPr/>
+        <p:txBody>
+          <a:bodyPr/>
+          <a:lstStyle/>
+          <a:p>
+            <a:fld id="{37D9B929-EEB3-453F-899C-B5737EAC3251}" type="slidenum">
+              <a:rPr lang="de-AT" smtClean="0"/>
+              <a:t>21</a:t>
+            </a:fld>
+            <a:endParaRPr lang="de-AT"/>
+          </a:p>
+        </p:txBody>
+      </p:sp>
+    </p:spTree>
+    <p:extLst>
+      <p:ext uri="{BB962C8B-B14F-4D97-AF65-F5344CB8AC3E}">
+        <p14:creationId xmlns:p14="http://schemas.microsoft.com/office/powerpoint/2010/main" val="307574156"/>
+      </p:ext>
+    </p:extLst>
+  </p:cSld>
+  <p:clrMapOvr>
+    <a:masterClrMapping/>
+  </p:clrMapOvr>
+</p:notes>
+</file>
+
+<file path=ppt/notesSlides/notesSlide21.xml><?xml version="1.0" encoding="utf-8"?>
+<p:notes xmlns:a="http://schemas.openxmlformats.org/drawingml/2006/main" xmlns:r="http://schemas.openxmlformats.org/officeDocument/2006/relationships" xmlns:p="http://schemas.openxmlformats.org/presentationml/2006/main">
+  <p:cSld>
+    <p:spTree>
+      <p:nvGrpSpPr>
+        <p:cNvPr id="1" name=""/>
+        <p:cNvGrpSpPr/>
+        <p:nvPr/>
+      </p:nvGrpSpPr>
+      <p:grpSpPr>
+        <a:xfrm>
+          <a:off x="0" y="0"/>
+          <a:ext cx="0" cy="0"/>
+          <a:chOff x="0" y="0"/>
+          <a:chExt cx="0" cy="0"/>
+        </a:xfrm>
+      </p:grpSpPr>
+      <p:sp>
+        <p:nvSpPr>
+          <p:cNvPr id="2" name="Slide Image Placeholder 1"/>
+          <p:cNvSpPr>
+            <a:spLocks noGrp="1" noRot="1" noChangeAspect="1"/>
+          </p:cNvSpPr>
+          <p:nvPr>
+            <p:ph type="sldImg"/>
+          </p:nvPr>
+        </p:nvSpPr>
+        <p:spPr/>
+      </p:sp>
+      <p:sp>
+        <p:nvSpPr>
+          <p:cNvPr id="3" name="Notes Placeholder 2"/>
+          <p:cNvSpPr>
+            <a:spLocks noGrp="1"/>
+          </p:cNvSpPr>
+          <p:nvPr>
+            <p:ph type="body" idx="1"/>
+          </p:nvPr>
+        </p:nvSpPr>
+        <p:spPr/>
+        <p:txBody>
+          <a:bodyPr/>
+          <a:lstStyle/>
+          <a:p>
+            <a:endParaRPr lang="de-DE" dirty="0"/>
+          </a:p>
+        </p:txBody>
+      </p:sp>
+      <p:sp>
+        <p:nvSpPr>
+          <p:cNvPr id="4" name="Header Placeholder 3"/>
+          <p:cNvSpPr>
+            <a:spLocks noGrp="1"/>
+          </p:cNvSpPr>
+          <p:nvPr>
+            <p:ph type="hdr" sz="quarter"/>
+          </p:nvPr>
+        </p:nvSpPr>
+        <p:spPr/>
+        <p:txBody>
+          <a:bodyPr/>
+          <a:lstStyle/>
+          <a:p>
+            <a:r>
+              <a:rPr lang="de-AT"/>
+              <a:t>fiskaltrust. consulting gmbh - confidential</a:t>
+            </a:r>
+            <a:endParaRPr lang="de-AT" dirty="0"/>
+          </a:p>
+        </p:txBody>
+      </p:sp>
+      <p:sp>
+        <p:nvSpPr>
+          <p:cNvPr id="5" name="Date Placeholder 4"/>
+          <p:cNvSpPr>
+            <a:spLocks noGrp="1"/>
+          </p:cNvSpPr>
+          <p:nvPr>
+            <p:ph type="dt" idx="1"/>
+          </p:nvPr>
+        </p:nvSpPr>
+        <p:spPr/>
+        <p:txBody>
+          <a:bodyPr/>
+          <a:lstStyle/>
+          <a:p>
+            <a:fld id="{E52F4C69-7549-4A71-BB0C-341D25F594E8}" type="datetime1">
+              <a:rPr lang="de-AT" smtClean="0"/>
+              <a:t>09.09.20</a:t>
+            </a:fld>
+            <a:endParaRPr lang="de-AT"/>
+          </a:p>
+        </p:txBody>
+      </p:sp>
+      <p:sp>
+        <p:nvSpPr>
+          <p:cNvPr id="6" name="Slide Number Placeholder 5"/>
+          <p:cNvSpPr>
+            <a:spLocks noGrp="1"/>
+          </p:cNvSpPr>
+          <p:nvPr>
+            <p:ph type="sldNum" sz="quarter" idx="5"/>
+          </p:nvPr>
+        </p:nvSpPr>
+        <p:spPr/>
+        <p:txBody>
+          <a:bodyPr/>
+          <a:lstStyle/>
+          <a:p>
+            <a:fld id="{37D9B929-EEB3-453F-899C-B5737EAC3251}" type="slidenum">
+              <a:rPr lang="de-AT" smtClean="0"/>
+              <a:t>22</a:t>
+            </a:fld>
+            <a:endParaRPr lang="de-AT"/>
+          </a:p>
+        </p:txBody>
+      </p:sp>
+    </p:spTree>
+    <p:extLst>
+      <p:ext uri="{BB962C8B-B14F-4D97-AF65-F5344CB8AC3E}">
+        <p14:creationId xmlns:p14="http://schemas.microsoft.com/office/powerpoint/2010/main" val="899144978"/>
       </p:ext>
     </p:extLst>
   </p:cSld>
@@ -5608,7 +6958,7 @@
             </a:pPr>
             <a:r>
               <a:rPr lang="de-DE" sz="1100" dirty="0"/>
-              <a:t>Kassenbetreiber können manuell oder automatisiert über das Portal eingeladen werden. Zum automatisierten Einladen vieler Kassenbetreiber wird eine CSV Datei verwendet, die zu diesem Zweck im Portal importiert wird. </a:t>
+              <a:t>Kassenbetreiber können manuell oder automatisiert über das Portal eingeladen werden. Zum automatisierten Einladen vieler Kassenbetreiber wird eine CSV Datei verwendet, die zu diesem Zweck im Portal importiert werden kann. </a:t>
             </a:r>
           </a:p>
           <a:p>
@@ -5631,7 +6981,7 @@
             </a:pPr>
             <a:r>
               <a:rPr lang="de-DE" sz="1100" dirty="0"/>
-              <a:t>Sobald die Einladung abgesetzt wurde, wird eine Einladungs-Email an den Kassenbetreiber gesendet. </a:t>
+              <a:t>Sobald die Einladung initiiert wurde, sendet fiskaltrust eine Einladungs-E-Mail an den Kassenbetreiber. Sie enthält Informationen und einem Email-Bestätigungs-Link.</a:t>
             </a:r>
           </a:p>
           <a:p>
@@ -5654,7 +7004,7 @@
             </a:pPr>
             <a:r>
               <a:rPr lang="de-DE" sz="1100" dirty="0"/>
-              <a:t>Dieser erhält daraufhin die Email mit Informationen und einem Email-Bestätigungs-Link.</a:t>
+              <a:t>Der Betreiber drückt den Link und wird auf das fiskaltrust Portal weiter geleitet wo er seine Daten überprüfen und sein Passwort setzen kann. Im nächsten Schritt muss er den Kooperationsvertrag mit fiskaltrust digital unterzeichnen. </a:t>
             </a:r>
           </a:p>
           <a:p>
@@ -5677,30 +7027,7 @@
             </a:pPr>
             <a:r>
               <a:rPr lang="de-DE" sz="1100" dirty="0"/>
-              <a:t>Der Betreiber drückt den Link und wird auf das fiskaltrust Portal weiter geleitet wo er seine Daten überprüfen und sein Passwort setzen kann. Im nächsten Schritt muss er den Kooperationsvertrag mit fiskaltrust digital unterzeichnen. </a:t>
-            </a:r>
-          </a:p>
-          <a:p>
-            <a:pPr marL="0" marR="0" lvl="0" indent="0" algn="l" defTabSz="914400" rtl="0" eaLnBrk="1" fontAlgn="auto" latinLnBrk="0" hangingPunct="1">
-              <a:lnSpc>
-                <a:spcPct val="100000"/>
-              </a:lnSpc>
-              <a:spcBef>
-                <a:spcPts val="0"/>
-              </a:spcBef>
-              <a:spcAft>
-                <a:spcPts val="0"/>
-              </a:spcAft>
-              <a:buClrTx/>
-              <a:buSzTx/>
-              <a:buFontTx/>
-              <a:buNone/>
-              <a:tabLst/>
-              <a:defRPr/>
-            </a:pPr>
-            <a:r>
-              <a:rPr lang="de-DE" sz="1100" dirty="0"/>
-              <a:t>Der Händler Zugriffsrechte für die sogenannte Surrogation Funktion anfordern. Damit kann der Händler später mit der </a:t>
+              <a:t>Der Händler kann Zugriffsrechte für die sogenannte Surrogation Funktion anfordern. Damit kann der Händler später mit der </a:t>
             </a:r>
             <a:r>
               <a:rPr lang="de-DE" sz="1100" dirty="0" err="1"/>
@@ -5716,7 +7043,7 @@
             </a:r>
             <a:r>
               <a:rPr lang="de-DE" sz="1100" dirty="0"/>
-              <a:t> und im Namen des Betreibers Produkte auschecken und notwendige Konfigurationen vornehmen.</a:t>
+              <a:t> und im Namen des Betreibers Produkte auschecken und technische Konfigurationen vornehmen.</a:t>
             </a:r>
           </a:p>
           <a:p>
@@ -5767,7 +7094,7 @@
           <a:p>
             <a:fld id="{E52F4C69-7549-4A71-BB0C-341D25F594E8}" type="datetime1">
               <a:rPr lang="de-AT" smtClean="0"/>
-              <a:t>08.09.20</a:t>
+              <a:t>09.09.20</a:t>
             </a:fld>
             <a:endParaRPr lang="de-AT"/>
           </a:p>
@@ -6061,7 +7388,7 @@
           <a:p>
             <a:fld id="{E52F4C69-7549-4A71-BB0C-341D25F594E8}" type="datetime1">
               <a:rPr lang="de-AT" smtClean="0"/>
-              <a:t>08.09.20</a:t>
+              <a:t>09.09.20</a:t>
             </a:fld>
             <a:endParaRPr lang="de-AT"/>
           </a:p>
@@ -6194,7 +7521,7 @@
           <a:p>
             <a:fld id="{E52F4C69-7549-4A71-BB0C-341D25F594E8}" type="datetime1">
               <a:rPr lang="de-AT" smtClean="0"/>
-              <a:t>08.09.20</a:t>
+              <a:t>09.09.20</a:t>
             </a:fld>
             <a:endParaRPr lang="de-AT"/>
           </a:p>
@@ -6282,7 +7609,7 @@
           <a:p>
             <a:r>
               <a:rPr lang="de-DE" dirty="0"/>
-              <a:t>Die fiskaltrust.Middleware wird mit Hilfe eines Launcher gestartet. </a:t>
+              <a:t>Die fiskaltrust.Middleware wird lokal mit Hilfe eines Launcher gestartet. </a:t>
             </a:r>
           </a:p>
           <a:p>
@@ -6291,7 +7618,7 @@
           <a:p>
             <a:r>
               <a:rPr lang="de-DE" dirty="0"/>
-              <a:t>Es gibt 2 Arten von Launcher: </a:t>
+              <a:t>Es sind 2 Arten von Launcher verfügbar: </a:t>
             </a:r>
           </a:p>
           <a:p>
@@ -6300,7 +7627,7 @@
             </a:pPr>
             <a:r>
               <a:rPr lang="de-DE" dirty="0"/>
-              <a:t>Online Launcher: -&gt; Lädt beim Start je nach Konfiguration die benötigten Pakete aus der Cloud.</a:t>
+              <a:t>Online Launcher: -&gt; Lädt beim Start je nach Konfiguration die benötigten Funktions-Pakete aus der Cloud.</a:t>
             </a:r>
           </a:p>
           <a:p>
@@ -6309,7 +7636,7 @@
             </a:pPr>
             <a:r>
               <a:rPr lang="de-DE" dirty="0"/>
-              <a:t>Offline Launcher: -&gt; Beinhaltet bereits alle notwendigen Pakete ist jedoch viel umfangreicher.</a:t>
+              <a:t>Offline Launcher: -&gt; Beinhaltet bereits alle notwendigen Funktions-Pakete ist jedoch viel umfangreicher.</a:t>
             </a:r>
           </a:p>
           <a:p>
@@ -6338,7 +7665,7 @@
             </a:pPr>
             <a:r>
               <a:rPr lang="de-DE" dirty="0"/>
-              <a:t>Vor dem Download des Launcher sollte die Cashbox neue zusammengebaut werden („</a:t>
+              <a:t>Vor dem Download des Launcher sollte die Cashbox neu zusammengebaut werden („</a:t>
             </a:r>
             <a:r>
               <a:rPr lang="de-DE" dirty="0" err="1"/>
@@ -6354,7 +7681,7 @@
             </a:r>
             <a:r>
               <a:rPr lang="de-DE" dirty="0"/>
-              <a:t>“) Button um sicher zu sein, dass zwischenzeitlich vorgenommene Änderungen an der Konfiguration auch angewendet werden. </a:t>
+              <a:t>“ – Button) um sicher zu sein, dass zwischenzeitlich vorgenommene Änderungen an den einzelnen Konfigurationen (Queue, SCU) auch angewendet werden. </a:t>
             </a:r>
           </a:p>
           <a:p>
@@ -6504,7 +7831,7 @@
             </a:r>
             <a:r>
               <a:rPr lang="de-DE" dirty="0"/>
-              <a:t>“  Button gedrückt und der Launcher neu gestartet, so lädt sich dieser automatisch die neue Konfiguration herunter und wendet diese an.</a:t>
+              <a:t>“  Button gedrückt und der Online-Launcher neu gestartet, so lädt sich dieser automatisch die neue Konfiguration herunter und wendet diese an.</a:t>
             </a:r>
           </a:p>
           <a:p>
@@ -6569,7 +7896,7 @@
           <a:p>
             <a:fld id="{E52F4C69-7549-4A71-BB0C-341D25F594E8}" type="datetime1">
               <a:rPr lang="de-AT" smtClean="0"/>
-              <a:t>08.09.20</a:t>
+              <a:t>09.09.20</a:t>
             </a:fld>
             <a:endParaRPr lang="de-AT"/>
           </a:p>
@@ -6666,7 +7993,7 @@
           <a:p>
             <a:r>
               <a:rPr lang="de-DE" dirty="0"/>
-              <a:t>Für die weiteren Inhalte zur Präsentation der Automatisierung siehe bitte:</a:t>
+              <a:t>Für die weiteren Inhalte zur Präsentation der Automatisierung wird als Vorlage folgende Dokumentation verwendet:</a:t>
             </a:r>
           </a:p>
           <a:p>
@@ -6762,7 +8089,7 @@
           <a:p>
             <a:fld id="{E52F4C69-7549-4A71-BB0C-341D25F594E8}" type="datetime1">
               <a:rPr lang="de-AT" smtClean="0"/>
-              <a:t>08.09.20</a:t>
+              <a:t>09.09.20</a:t>
             </a:fld>
             <a:endParaRPr lang="de-AT"/>
           </a:p>
@@ -6848,7 +8175,26 @@
           <a:bodyPr/>
           <a:lstStyle/>
           <a:p>
-            <a:endParaRPr lang="de-DE" dirty="0"/>
+            <a:r>
+              <a:rPr lang="de-DE" dirty="0"/>
+              <a:t>Update des SQL Package auf Version 1.3.5 für aller Cashboxen die aktuell mit der Version 1.3.3 konfiguriert sind + </a:t>
+            </a:r>
+            <a:r>
+              <a:rPr lang="de-DE" dirty="0" err="1"/>
+              <a:t>Rebuild</a:t>
+            </a:r>
+            <a:r>
+              <a:rPr lang="de-DE" dirty="0"/>
+              <a:t> </a:t>
+            </a:r>
+            <a:r>
+              <a:rPr lang="de-DE" dirty="0" err="1"/>
+              <a:t>Configuration</a:t>
+            </a:r>
+            <a:r>
+              <a:rPr lang="de-DE" dirty="0"/>
+              <a:t> </a:t>
+            </a:r>
           </a:p>
         </p:txBody>
       </p:sp>
@@ -6892,7 +8238,7 @@
           <a:p>
             <a:fld id="{E52F4C69-7549-4A71-BB0C-341D25F594E8}" type="datetime1">
               <a:rPr lang="de-AT" smtClean="0"/>
-              <a:t>08.09.20</a:t>
+              <a:t>09.09.20</a:t>
             </a:fld>
             <a:endParaRPr lang="de-AT"/>
           </a:p>
@@ -6978,6 +8324,60 @@
           <a:bodyPr/>
           <a:lstStyle/>
           <a:p>
+            <a:r>
+              <a:rPr lang="de-DE" dirty="0"/>
+              <a:t>Vorführung Anhand:</a:t>
+            </a:r>
+          </a:p>
+          <a:p>
+            <a:r>
+              <a:rPr lang="de-DE" dirty="0"/>
+              <a:t>https://</a:t>
+            </a:r>
+            <a:r>
+              <a:rPr lang="de-DE" dirty="0" err="1"/>
+              <a:t>docs.fiskaltrust.cloud</a:t>
+            </a:r>
+            <a:r>
+              <a:rPr lang="de-DE" dirty="0"/>
+              <a:t>/</a:t>
+            </a:r>
+            <a:r>
+              <a:rPr lang="de-DE" dirty="0" err="1"/>
+              <a:t>doc</a:t>
+            </a:r>
+            <a:r>
+              <a:rPr lang="de-DE" dirty="0"/>
+              <a:t>/</a:t>
+            </a:r>
+            <a:r>
+              <a:rPr lang="de-DE" dirty="0" err="1"/>
+              <a:t>productdescription</a:t>
+            </a:r>
+            <a:r>
+              <a:rPr lang="de-DE" dirty="0"/>
+              <a:t>-de-</a:t>
+            </a:r>
+            <a:r>
+              <a:rPr lang="de-DE" dirty="0" err="1"/>
+              <a:t>doc</a:t>
+            </a:r>
+            <a:r>
+              <a:rPr lang="de-DE" dirty="0"/>
+              <a:t>/</a:t>
+            </a:r>
+            <a:r>
+              <a:rPr lang="de-DE" dirty="0" err="1"/>
+              <a:t>for-posdealers</a:t>
+            </a:r>
+            <a:r>
+              <a:rPr lang="de-DE" dirty="0"/>
+              <a:t>/02-pre-sales/automatisierter-</a:t>
+            </a:r>
+            <a:r>
+              <a:rPr lang="de-DE" dirty="0" err="1"/>
+              <a:t>rollout.html</a:t>
+            </a:r>
             <a:endParaRPr lang="de-DE" dirty="0"/>
           </a:p>
         </p:txBody>
@@ -7022,7 +8422,7 @@
           <a:p>
             <a:fld id="{E52F4C69-7549-4A71-BB0C-341D25F594E8}" type="datetime1">
               <a:rPr lang="de-AT" smtClean="0"/>
-              <a:t>08.09.20</a:t>
+              <a:t>09.09.20</a:t>
             </a:fld>
             <a:endParaRPr lang="de-AT"/>
           </a:p>
@@ -8298,7 +9698,7 @@
             <a:fld id="{D920586B-A06C-4754-BF0D-C36EFEB7D1BE}" type="datetime1">
               <a:rPr lang="de-DE" smtClean="0"/>
               <a:pPr/>
-              <a:t>08.09.20</a:t>
+              <a:t>09.09.20</a:t>
             </a:fld>
             <a:endParaRPr lang="de-AT" dirty="0"/>
           </a:p>
@@ -11108,7 +12508,7 @@
           <p:nvPr/>
         </p:nvPicPr>
         <p:blipFill>
-          <a:blip r:embed="rId2">
+          <a:blip r:embed="rId3">
             <a:extLst>
               <a:ext uri="{28A0092B-C50C-407E-A947-70E740481C1C}">
                 <a14:useLocalDpi xmlns:a14="http://schemas.microsoft.com/office/drawing/2010/main" val="0"/>
@@ -14073,15 +15473,6 @@
 </file>
 
 <file path=customXml/item1.xml><?xml version="1.0" encoding="utf-8"?>
-<?mso-contentType ?>
-<FormTemplates xmlns="http://schemas.microsoft.com/sharepoint/v3/contenttype/forms">
-  <Display>DocumentLibraryForm</Display>
-  <Edit>DocumentLibraryForm</Edit>
-  <New>DocumentLibraryForm</New>
-</FormTemplates>
-</file>
-
-<file path=customXml/item2.xml><?xml version="1.0" encoding="utf-8"?>
 <p:properties xmlns:p="http://schemas.microsoft.com/office/2006/metadata/properties" xmlns:xsi="http://www.w3.org/2001/XMLSchema-instance" xmlns:pc="http://schemas.microsoft.com/office/infopath/2007/PartnerControls">
   <documentManagement>
     <MigrationWizIdPermissions xmlns="86d55d5a-583b-4ffa-ba38-1d7d24766b92" xsi:nil="true"/>
@@ -14091,6 +15482,15 @@
     <MigrationWizIdDocumentLibraryPermissions xmlns="86d55d5a-583b-4ffa-ba38-1d7d24766b92" xsi:nil="true"/>
   </documentManagement>
 </p:properties>
+</file>
+
+<file path=customXml/item2.xml><?xml version="1.0" encoding="utf-8"?>
+<?mso-contentType ?>
+<FormTemplates xmlns="http://schemas.microsoft.com/sharepoint/v3/contenttype/forms">
+  <Display>DocumentLibraryForm</Display>
+  <Edit>DocumentLibraryForm</Edit>
+  <New>DocumentLibraryForm</New>
+</FormTemplates>
 </file>
 
 <file path=customXml/item3.xml><?xml version="1.0" encoding="utf-8"?>
@@ -14347,19 +15747,19 @@
 </file>
 
 <file path=customXml/itemProps1.xml><?xml version="1.0" encoding="utf-8"?>
-<ds:datastoreItem xmlns:ds="http://schemas.openxmlformats.org/officeDocument/2006/customXml" ds:itemID="{3F407387-4BEA-45E7-A546-EAF24BCEADF4}">
+<ds:datastoreItem xmlns:ds="http://schemas.openxmlformats.org/officeDocument/2006/customXml" ds:itemID="{A770BCC9-0480-4A5F-A5A5-05648EB42497}">
   <ds:schemaRefs>
-    <ds:schemaRef ds:uri="http://schemas.microsoft.com/sharepoint/v3/contenttype/forms"/>
+    <ds:schemaRef ds:uri="http://schemas.microsoft.com/office/2006/metadata/properties"/>
+    <ds:schemaRef ds:uri="http://schemas.microsoft.com/office/infopath/2007/PartnerControls"/>
+    <ds:schemaRef ds:uri="86d55d5a-583b-4ffa-ba38-1d7d24766b92"/>
   </ds:schemaRefs>
 </ds:datastoreItem>
 </file>
 
 <file path=customXml/itemProps2.xml><?xml version="1.0" encoding="utf-8"?>
-<ds:datastoreItem xmlns:ds="http://schemas.openxmlformats.org/officeDocument/2006/customXml" ds:itemID="{A770BCC9-0480-4A5F-A5A5-05648EB42497}">
+<ds:datastoreItem xmlns:ds="http://schemas.openxmlformats.org/officeDocument/2006/customXml" ds:itemID="{3F407387-4BEA-45E7-A546-EAF24BCEADF4}">
   <ds:schemaRefs>
-    <ds:schemaRef ds:uri="http://schemas.microsoft.com/office/2006/metadata/properties"/>
-    <ds:schemaRef ds:uri="http://schemas.microsoft.com/office/infopath/2007/PartnerControls"/>
-    <ds:schemaRef ds:uri="86d55d5a-583b-4ffa-ba38-1d7d24766b92"/>
+    <ds:schemaRef ds:uri="http://schemas.microsoft.com/sharepoint/v3/contenttype/forms"/>
   </ds:schemaRefs>
 </ds:datastoreItem>
 </file>

</xml_diff>